<commit_message>
Updates 25 Nov 2020
</commit_message>
<xml_diff>
--- a/PowerShell/PowerShell Crash Course/PowerShell Crash Course.pptx
+++ b/PowerShell/PowerShell Crash Course/PowerShell Crash Course.pptx
@@ -12037,7 +12037,7 @@
           <a:p>
             <a:fld id="{58E92B35-D2D5-4726-A13F-6F84E19963F1}" type="datetime10">
               <a:rPr lang="en-US" smtClean="0"/>
-              <a:t>09:34</a:t>
+              <a:t>10:53</a:t>
             </a:fld>
             <a:endParaRPr lang="en-US" dirty="0"/>
           </a:p>
@@ -12332,7 +12332,7 @@
           <a:p>
             <a:fld id="{DB8393E3-5B4E-41F2-95CA-B8CA0A25C91A}" type="datetime10">
               <a:rPr lang="en-US" smtClean="0"/>
-              <a:t>09:34</a:t>
+              <a:t>10:53</a:t>
             </a:fld>
             <a:endParaRPr lang="en-US" dirty="0"/>
           </a:p>
@@ -12595,7 +12595,7 @@
           <a:p>
             <a:fld id="{85DFC02D-7C20-4C14-81A3-AA9C559B9CDE}" type="datetime10">
               <a:rPr lang="en-US" smtClean="0"/>
-              <a:t>09:34</a:t>
+              <a:t>10:53</a:t>
             </a:fld>
             <a:endParaRPr lang="en-US" dirty="0"/>
           </a:p>
@@ -13070,7 +13070,7 @@
           <a:p>
             <a:fld id="{85DFC02D-7C20-4C14-81A3-AA9C559B9CDE}" type="datetime10">
               <a:rPr lang="en-US" smtClean="0"/>
-              <a:t>09:34</a:t>
+              <a:t>10:53</a:t>
             </a:fld>
             <a:endParaRPr lang="en-US" dirty="0"/>
           </a:p>
@@ -13256,7 +13256,7 @@
           <a:p>
             <a:fld id="{85DFC02D-7C20-4C14-81A3-AA9C559B9CDE}" type="datetime10">
               <a:rPr lang="en-US" smtClean="0"/>
-              <a:t>09:34</a:t>
+              <a:t>10:53</a:t>
             </a:fld>
             <a:endParaRPr lang="en-US" dirty="0"/>
           </a:p>
@@ -13838,7 +13838,7 @@
           <a:p>
             <a:fld id="{85DFC02D-7C20-4C14-81A3-AA9C559B9CDE}" type="datetime10">
               <a:rPr lang="en-US" smtClean="0"/>
-              <a:t>09:34</a:t>
+              <a:t>10:53</a:t>
             </a:fld>
             <a:endParaRPr lang="en-US" dirty="0"/>
           </a:p>
@@ -14176,7 +14176,7 @@
           <a:p>
             <a:fld id="{85DFC02D-7C20-4C14-81A3-AA9C559B9CDE}" type="datetime10">
               <a:rPr lang="en-US" smtClean="0"/>
-              <a:t>09:34</a:t>
+              <a:t>10:53</a:t>
             </a:fld>
             <a:endParaRPr lang="en-US" dirty="0"/>
           </a:p>
@@ -14357,7 +14357,7 @@
           <a:p>
             <a:fld id="{325DD708-6B17-4D9C-A4DF-16A192868963}" type="datetime10">
               <a:rPr lang="en-US" smtClean="0"/>
-              <a:t>09:34</a:t>
+              <a:t>10:53</a:t>
             </a:fld>
             <a:endParaRPr lang="en-US" dirty="0"/>
           </a:p>
@@ -14541,7 +14541,7 @@
           <a:p>
             <a:fld id="{C2C68490-42DB-47E3-B332-1B49C0F554FE}" type="datetime10">
               <a:rPr lang="en-US" smtClean="0"/>
-              <a:t>09:34</a:t>
+              <a:t>10:53</a:t>
             </a:fld>
             <a:endParaRPr lang="en-US" dirty="0"/>
           </a:p>
@@ -14715,7 +14715,7 @@
           <a:p>
             <a:fld id="{BFAC2F79-8E42-4B05-A001-62A9AB046C0D}" type="datetime10">
               <a:rPr lang="en-US" smtClean="0"/>
-              <a:t>09:34</a:t>
+              <a:t>10:53</a:t>
             </a:fld>
             <a:endParaRPr lang="en-US" dirty="0"/>
           </a:p>
@@ -14976,7 +14976,7 @@
           <a:p>
             <a:fld id="{DA038EC0-3F59-4ABA-88BC-5BAD87326C78}" type="datetime10">
               <a:rPr lang="en-US" smtClean="0"/>
-              <a:t>09:34</a:t>
+              <a:t>10:53</a:t>
             </a:fld>
             <a:endParaRPr lang="en-US" dirty="0"/>
           </a:p>
@@ -15272,7 +15272,7 @@
           <a:p>
             <a:fld id="{A37CF554-B527-45BC-92EC-85AF5AD45FA3}" type="datetime10">
               <a:rPr lang="en-US" smtClean="0"/>
-              <a:t>09:34</a:t>
+              <a:t>10:53</a:t>
             </a:fld>
             <a:endParaRPr lang="en-US" dirty="0"/>
           </a:p>
@@ -15706,7 +15706,7 @@
           <a:p>
             <a:fld id="{F96FFFF5-A40D-421C-BFB2-E2642773C38F}" type="datetime10">
               <a:rPr lang="en-US" smtClean="0"/>
-              <a:t>09:34</a:t>
+              <a:t>10:53</a:t>
             </a:fld>
             <a:endParaRPr lang="en-US" dirty="0"/>
           </a:p>
@@ -15828,7 +15828,7 @@
           <a:p>
             <a:fld id="{01A19755-FA60-4F30-9293-69E2B8723AA9}" type="datetime10">
               <a:rPr lang="en-US" smtClean="0"/>
-              <a:t>09:34</a:t>
+              <a:t>10:53</a:t>
             </a:fld>
             <a:endParaRPr lang="en-US" dirty="0"/>
           </a:p>
@@ -15927,7 +15927,7 @@
           <a:p>
             <a:fld id="{3F4FFFD7-D8A1-4491-B156-4AB843D1858F}" type="datetime10">
               <a:rPr lang="en-US" smtClean="0"/>
-              <a:t>09:34</a:t>
+              <a:t>10:53</a:t>
             </a:fld>
             <a:endParaRPr lang="en-US" dirty="0"/>
           </a:p>
@@ -16214,7 +16214,7 @@
           <a:p>
             <a:fld id="{325C6AB4-9520-48DF-AE6E-1ADA6ABA0605}" type="datetime10">
               <a:rPr lang="en-US" smtClean="0"/>
-              <a:t>09:34</a:t>
+              <a:t>10:53</a:t>
             </a:fld>
             <a:endParaRPr lang="en-US" dirty="0"/>
           </a:p>
@@ -16509,7 +16509,7 @@
           <a:p>
             <a:fld id="{432BA400-984C-4D9E-9F95-E9992C0D894A}" type="datetime10">
               <a:rPr lang="en-US" smtClean="0"/>
-              <a:t>09:34</a:t>
+              <a:t>10:53</a:t>
             </a:fld>
             <a:endParaRPr lang="en-US" dirty="0"/>
           </a:p>
@@ -16744,7 +16744,7 @@
           <a:p>
             <a:fld id="{85DFC02D-7C20-4C14-81A3-AA9C559B9CDE}" type="datetime10">
               <a:rPr lang="en-US" smtClean="0"/>
-              <a:t>09:34</a:t>
+              <a:t>10:53</a:t>
             </a:fld>
             <a:endParaRPr lang="en-US" dirty="0"/>
           </a:p>
@@ -18341,7 +18341,7 @@
                   <a:spcPts val="600"/>
                 </a:spcAft>
               </a:pPr>
-              <a:t>09:34</a:t>
+              <a:t>10:53</a:t>
             </a:fld>
             <a:endParaRPr lang="en-US">
               <a:solidFill>
@@ -18596,7 +18596,7 @@
           <a:p>
             <a:fld id="{411386BF-A9F7-48F5-BE9E-C6F3E2407584}" type="datetime10">
               <a:rPr lang="en-US" smtClean="0"/>
-              <a:t>09:34</a:t>
+              <a:t>10:53</a:t>
             </a:fld>
             <a:endParaRPr lang="en-US" dirty="0"/>
           </a:p>
@@ -18782,7 +18782,7 @@
           <a:p>
             <a:fld id="{D0D54DC8-74EB-43D7-BDD2-347F8FCB901D}" type="datetime10">
               <a:rPr lang="en-US" smtClean="0"/>
-              <a:t>09:34</a:t>
+              <a:t>10:53</a:t>
             </a:fld>
             <a:endParaRPr lang="en-US" dirty="0"/>
           </a:p>
@@ -18938,7 +18938,7 @@
           <a:p>
             <a:fld id="{612721A5-9267-4A84-AAA4-EAA27041C262}" type="datetime10">
               <a:rPr lang="en-US" smtClean="0"/>
-              <a:t>09:34</a:t>
+              <a:t>10:53</a:t>
             </a:fld>
             <a:endParaRPr lang="en-US" dirty="0"/>
           </a:p>
@@ -19202,7 +19202,7 @@
           <a:p>
             <a:fld id="{670D266C-5E7A-4E49-8A4D-91083D8C7E85}" type="datetime10">
               <a:rPr lang="en-US" smtClean="0"/>
-              <a:t>09:34</a:t>
+              <a:t>10:53</a:t>
             </a:fld>
             <a:endParaRPr lang="en-US" dirty="0"/>
           </a:p>
@@ -19428,7 +19428,7 @@
           <a:p>
             <a:fld id="{BE68C2A5-DDF5-44AA-B5D8-FD0F6BF941D3}" type="datetime10">
               <a:rPr lang="en-US" smtClean="0"/>
-              <a:t>09:34</a:t>
+              <a:t>10:53</a:t>
             </a:fld>
             <a:endParaRPr lang="en-US" dirty="0"/>
           </a:p>
@@ -19638,7 +19638,7 @@
           <a:p>
             <a:fld id="{C512FE45-71B5-48BC-B8E9-6ADE687770C3}" type="datetime10">
               <a:rPr lang="en-US" smtClean="0"/>
-              <a:t>09:34</a:t>
+              <a:t>10:53</a:t>
             </a:fld>
             <a:endParaRPr lang="en-US" dirty="0"/>
           </a:p>
@@ -19859,7 +19859,7 @@
           <a:p>
             <a:fld id="{BDD439D0-EE23-47F2-9021-5592E32D82D0}" type="datetime10">
               <a:rPr lang="en-US" smtClean="0"/>
-              <a:t>09:34</a:t>
+              <a:t>10:53</a:t>
             </a:fld>
             <a:endParaRPr lang="en-US" dirty="0"/>
           </a:p>
@@ -20063,7 +20063,7 @@
           <a:p>
             <a:fld id="{993447D2-0F82-4F4A-9EC4-0490A8CBC637}" type="datetime10">
               <a:rPr lang="en-US" smtClean="0"/>
-              <a:t>09:34</a:t>
+              <a:t>10:53</a:t>
             </a:fld>
             <a:endParaRPr lang="en-US" dirty="0"/>
           </a:p>
@@ -20510,7 +20510,7 @@
           <a:p>
             <a:fld id="{DB9C5AB6-2D83-4825-9DA8-8F71B79C15F9}" type="datetime10">
               <a:rPr lang="en-US" smtClean="0"/>
-              <a:t>09:34</a:t>
+              <a:t>10:53</a:t>
             </a:fld>
             <a:endParaRPr lang="en-US" dirty="0"/>
           </a:p>
@@ -20719,7 +20719,7 @@
           <a:p>
             <a:fld id="{C819992B-D5A4-47BA-9691-2844121D0A95}" type="datetime10">
               <a:rPr lang="en-US" smtClean="0"/>
-              <a:t>09:34</a:t>
+              <a:t>10:53</a:t>
             </a:fld>
             <a:endParaRPr lang="en-US" dirty="0"/>
           </a:p>
@@ -20933,7 +20933,7 @@
           <a:p>
             <a:fld id="{83A4DADD-662D-4B36-80E7-FD61C3CB38E0}" type="datetime10">
               <a:rPr lang="en-US" smtClean="0"/>
-              <a:t>09:34</a:t>
+              <a:t>10:53</a:t>
             </a:fld>
             <a:endParaRPr lang="en-US" dirty="0"/>
           </a:p>
@@ -21234,7 +21234,7 @@
           <a:p>
             <a:fld id="{B178CE08-DEC2-4B1A-9EAC-A06C9D89874A}" type="datetime10">
               <a:rPr lang="en-US" smtClean="0"/>
-              <a:t>09:34</a:t>
+              <a:t>10:53</a:t>
             </a:fld>
             <a:endParaRPr lang="en-US" dirty="0"/>
           </a:p>
@@ -21497,7 +21497,7 @@
           <a:p>
             <a:fld id="{B2564B6B-F23B-43AB-9C20-F198B85126E5}" type="datetime10">
               <a:rPr lang="en-US" smtClean="0"/>
-              <a:t>09:34</a:t>
+              <a:t>10:53</a:t>
             </a:fld>
             <a:endParaRPr lang="en-US" dirty="0"/>
           </a:p>
@@ -21823,7 +21823,7 @@
           <a:p>
             <a:fld id="{BD2B43F2-C185-4C95-AA63-DF367E6841AA}" type="datetime10">
               <a:rPr lang="en-US" smtClean="0"/>
-              <a:t>09:34</a:t>
+              <a:t>10:53</a:t>
             </a:fld>
             <a:endParaRPr lang="en-US" dirty="0"/>
           </a:p>
@@ -21949,7 +21949,7 @@
           <a:p>
             <a:fld id="{612721A5-9267-4A84-AAA4-EAA27041C262}" type="datetime10">
               <a:rPr lang="en-US" smtClean="0"/>
-              <a:t>09:34</a:t>
+              <a:t>10:53</a:t>
             </a:fld>
             <a:endParaRPr lang="en-US" dirty="0"/>
           </a:p>
@@ -22201,7 +22201,7 @@
           <a:p>
             <a:fld id="{A678FD32-34C3-404C-A5A3-4C55061BA44B}" type="datetime10">
               <a:rPr lang="en-US" smtClean="0"/>
-              <a:t>09:34</a:t>
+              <a:t>10:53</a:t>
             </a:fld>
             <a:endParaRPr lang="en-US" dirty="0"/>
           </a:p>
@@ -22489,7 +22489,7 @@
           <a:p>
             <a:fld id="{42C6551C-F093-4C7E-88E9-E747A3634D81}" type="datetime10">
               <a:rPr lang="en-US" smtClean="0"/>
-              <a:t>09:34</a:t>
+              <a:t>10:53</a:t>
             </a:fld>
             <a:endParaRPr lang="en-US" dirty="0"/>
           </a:p>
@@ -22724,7 +22724,7 @@
           <a:p>
             <a:fld id="{9C3F4EC9-C16C-4996-B2B8-1A6F0D5128B7}" type="datetime10">
               <a:rPr lang="en-US" smtClean="0"/>
-              <a:t>09:34</a:t>
+              <a:t>10:53</a:t>
             </a:fld>
             <a:endParaRPr lang="en-US" dirty="0"/>
           </a:p>
@@ -22947,7 +22947,7 @@
           <a:p>
             <a:fld id="{534DF9C9-6EE2-4E0B-971D-3DD6BAC9A8BD}" type="datetime10">
               <a:rPr lang="en-US" smtClean="0"/>
-              <a:t>09:34</a:t>
+              <a:t>10:53</a:t>
             </a:fld>
             <a:endParaRPr lang="en-US" dirty="0"/>
           </a:p>
@@ -23169,7 +23169,7 @@
           <a:p>
             <a:fld id="{23162A0D-3874-413B-BBF3-8CDD681DAD1F}" type="datetime10">
               <a:rPr lang="en-US" smtClean="0"/>
-              <a:t>09:34</a:t>
+              <a:t>10:53</a:t>
             </a:fld>
             <a:endParaRPr lang="en-US" dirty="0"/>
           </a:p>
@@ -23412,7 +23412,7 @@
           <a:p>
             <a:fld id="{A89045B4-BC7F-449C-98D9-208601746F18}" type="datetime10">
               <a:rPr lang="en-US" smtClean="0"/>
-              <a:t>09:34</a:t>
+              <a:t>10:53</a:t>
             </a:fld>
             <a:endParaRPr lang="en-US" dirty="0"/>
           </a:p>
@@ -23622,7 +23622,7 @@
           <a:p>
             <a:fld id="{ED8BBD01-6901-4DE0-8BAF-918E7D20561B}" type="datetime10">
               <a:rPr lang="en-US" smtClean="0"/>
-              <a:t>09:34</a:t>
+              <a:t>10:53</a:t>
             </a:fld>
             <a:endParaRPr lang="en-US" dirty="0"/>
           </a:p>
@@ -23856,7 +23856,7 @@
           <a:p>
             <a:fld id="{78C4BD6E-1017-4246-BA83-EF1304BA900C}" type="datetime10">
               <a:rPr lang="en-US" smtClean="0"/>
-              <a:t>09:34</a:t>
+              <a:t>10:53</a:t>
             </a:fld>
             <a:endParaRPr lang="en-US" dirty="0"/>
           </a:p>
@@ -24069,7 +24069,7 @@
           <a:p>
             <a:fld id="{B9B22A8B-2914-414D-AAE6-42F25AC9ABD2}" type="datetime10">
               <a:rPr lang="en-US" smtClean="0"/>
-              <a:t>09:34</a:t>
+              <a:t>10:53</a:t>
             </a:fld>
             <a:endParaRPr lang="en-US" dirty="0"/>
           </a:p>
@@ -24227,7 +24227,7 @@
           <a:p>
             <a:fld id="{AF5620E9-9E82-4EF3-8B8D-1F69A0DF57B7}" type="datetime10">
               <a:rPr lang="en-US" smtClean="0"/>
-              <a:t>09:34</a:t>
+              <a:t>10:53</a:t>
             </a:fld>
             <a:endParaRPr lang="en-US" dirty="0"/>
           </a:p>
@@ -24452,7 +24452,7 @@
           <a:p>
             <a:fld id="{36B528A2-7DE9-46A8-8AE2-8C2E0CB70AB7}" type="datetime10">
               <a:rPr lang="en-US" smtClean="0"/>
-              <a:t>09:34</a:t>
+              <a:t>10:53</a:t>
             </a:fld>
             <a:endParaRPr lang="en-US" dirty="0"/>
           </a:p>
@@ -24607,7 +24607,7 @@
           <a:p>
             <a:fld id="{9D465932-D5AE-460D-BAC9-5F9CE2E3AD72}" type="datetime10">
               <a:rPr lang="en-US" smtClean="0"/>
-              <a:t>09:34</a:t>
+              <a:t>10:53</a:t>
             </a:fld>
             <a:endParaRPr lang="en-US" dirty="0"/>
           </a:p>
@@ -24950,7 +24950,7 @@
           <a:p>
             <a:fld id="{893ED4B7-35A3-48DB-B0FB-894612E8D307}" type="datetime10">
               <a:rPr lang="en-US" smtClean="0"/>
-              <a:t>09:34</a:t>
+              <a:t>10:53</a:t>
             </a:fld>
             <a:endParaRPr lang="en-US" dirty="0"/>
           </a:p>
@@ -25220,7 +25220,7 @@
           <a:p>
             <a:fld id="{51EEA2F8-AD0C-49BA-B8B6-5E565A340356}" type="datetime10">
               <a:rPr lang="en-US" smtClean="0"/>
-              <a:t>09:34</a:t>
+              <a:t>10:53</a:t>
             </a:fld>
             <a:endParaRPr lang="en-US" dirty="0"/>
           </a:p>
@@ -25346,7 +25346,7 @@
           <a:p>
             <a:fld id="{612721A5-9267-4A84-AAA4-EAA27041C262}" type="datetime10">
               <a:rPr lang="en-US" smtClean="0"/>
-              <a:t>09:34</a:t>
+              <a:t>10:53</a:t>
             </a:fld>
             <a:endParaRPr lang="en-US" dirty="0"/>
           </a:p>
@@ -25611,7 +25611,7 @@
           <a:p>
             <a:fld id="{47BE7236-3E68-4B6D-8DB3-088608DA9894}" type="datetime10">
               <a:rPr lang="en-US" smtClean="0"/>
-              <a:t>09:34</a:t>
+              <a:t>10:53</a:t>
             </a:fld>
             <a:endParaRPr lang="en-US" dirty="0"/>
           </a:p>
@@ -26435,7 +26435,7 @@
           <a:p>
             <a:fld id="{5B2150E8-F027-444C-B5C7-8A3DEFDD4617}" type="datetime10">
               <a:rPr lang="en-US" smtClean="0"/>
-              <a:t>09:34</a:t>
+              <a:t>10:53</a:t>
             </a:fld>
             <a:endParaRPr lang="en-US" dirty="0"/>
           </a:p>
@@ -26636,7 +26636,7 @@
           <a:p>
             <a:fld id="{9E37319A-020E-468E-BCD8-4ABB3B2C95A9}" type="datetime10">
               <a:rPr lang="en-US" smtClean="0"/>
-              <a:t>09:34</a:t>
+              <a:t>10:53</a:t>
             </a:fld>
             <a:endParaRPr lang="en-US" dirty="0"/>
           </a:p>
@@ -27333,7 +27333,7 @@
           <a:p>
             <a:fld id="{6F4A90D8-1917-4A04-AF17-F7B02F8F60EE}" type="datetime10">
               <a:rPr lang="en-US" smtClean="0"/>
-              <a:t>09:34</a:t>
+              <a:t>10:53</a:t>
             </a:fld>
             <a:endParaRPr lang="en-US" dirty="0"/>
           </a:p>
@@ -27696,7 +27696,7 @@
           <a:p>
             <a:fld id="{F6CC9819-AC06-4FC2-A796-082031AA6AC8}" type="datetime10">
               <a:rPr lang="en-US" smtClean="0"/>
-              <a:t>09:34</a:t>
+              <a:t>10:53</a:t>
             </a:fld>
             <a:endParaRPr lang="en-US" dirty="0"/>
           </a:p>
@@ -28308,7 +28308,7 @@
           <a:p>
             <a:fld id="{40DD72D6-CE72-41E8-9278-06CFFC5756C2}" type="datetime10">
               <a:rPr lang="en-US" smtClean="0"/>
-              <a:t>09:34</a:t>
+              <a:t>10:53</a:t>
             </a:fld>
             <a:endParaRPr lang="en-US" dirty="0"/>
           </a:p>
@@ -28558,7 +28558,7 @@
           <a:p>
             <a:fld id="{34065890-7EAB-4B6B-8919-A39510E705EF}" type="datetime10">
               <a:rPr lang="en-US" smtClean="0"/>
-              <a:t>09:34</a:t>
+              <a:t>10:53</a:t>
             </a:fld>
             <a:endParaRPr lang="en-US" dirty="0"/>
           </a:p>
@@ -28808,7 +28808,7 @@
           <a:p>
             <a:fld id="{487DA212-2CA9-4481-B40E-122ACBC73115}" type="datetime10">
               <a:rPr lang="en-US" smtClean="0"/>
-              <a:t>09:34</a:t>
+              <a:t>10:53</a:t>
             </a:fld>
             <a:endParaRPr lang="en-US" dirty="0"/>
           </a:p>
@@ -29394,7 +29394,7 @@
           <a:p>
             <a:fld id="{F087CB8E-2F76-453D-9682-559E5069F13C}" type="datetime10">
               <a:rPr lang="en-US" smtClean="0"/>
-              <a:t>09:34</a:t>
+              <a:t>10:53</a:t>
             </a:fld>
             <a:endParaRPr lang="en-US" dirty="0"/>
           </a:p>
@@ -30016,7 +30016,7 @@
           <a:p>
             <a:fld id="{37F56A88-4E0A-48B6-B34B-1001C096C1CF}" type="datetime10">
               <a:rPr lang="en-US" smtClean="0"/>
-              <a:t>09:34</a:t>
+              <a:t>10:53</a:t>
             </a:fld>
             <a:endParaRPr lang="en-US" dirty="0"/>
           </a:p>
@@ -30227,7 +30227,7 @@
           <a:p>
             <a:fld id="{DB87CD69-3618-4B1F-84C8-B918BE91689D}" type="datetime10">
               <a:rPr lang="en-US" smtClean="0"/>
-              <a:t>09:34</a:t>
+              <a:t>10:53</a:t>
             </a:fld>
             <a:endParaRPr lang="en-US" dirty="0"/>
           </a:p>
@@ -30489,7 +30489,7 @@
           <a:p>
             <a:fld id="{E012DB48-4E84-4715-BDDD-C8F1A9028912}" type="datetime10">
               <a:rPr lang="en-US" smtClean="0"/>
-              <a:t>09:34</a:t>
+              <a:t>10:53</a:t>
             </a:fld>
             <a:endParaRPr lang="en-US" dirty="0"/>
           </a:p>
@@ -30888,7 +30888,7 @@
           <a:p>
             <a:fld id="{612721A5-9267-4A84-AAA4-EAA27041C262}" type="datetime10">
               <a:rPr lang="en-US" smtClean="0"/>
-              <a:t>09:34</a:t>
+              <a:t>10:53</a:t>
             </a:fld>
             <a:endParaRPr lang="en-US" dirty="0"/>
           </a:p>
@@ -31106,38 +31106,6 @@
           </a:p>
         </p:txBody>
       </p:sp>
-      <p:pic>
-        <p:nvPicPr>
-          <p:cNvPr id="14" name="Content Placeholder 13">
-            <a:extLst>
-              <a:ext uri="{FF2B5EF4-FFF2-40B4-BE49-F238E27FC236}">
-                <a16:creationId xmlns:a16="http://schemas.microsoft.com/office/drawing/2014/main" id="{031B12BC-039A-4251-9C5C-206DCE53A1CB}"/>
-              </a:ext>
-            </a:extLst>
-          </p:cNvPr>
-          <p:cNvPicPr>
-            <a:picLocks noGrp="1" noChangeAspect="1"/>
-          </p:cNvPicPr>
-          <p:nvPr>
-            <p:ph sz="half" idx="2"/>
-          </p:nvPr>
-        </p:nvPicPr>
-        <p:blipFill>
-          <a:blip r:embed="rId3"/>
-          <a:stretch>
-            <a:fillRect/>
-          </a:stretch>
-        </p:blipFill>
-        <p:spPr>
-          <a:xfrm>
-            <a:off x="5094720" y="2872454"/>
-            <a:ext cx="4572000" cy="2398163"/>
-          </a:xfrm>
-          <a:prstGeom prst="rect">
-            <a:avLst/>
-          </a:prstGeom>
-        </p:spPr>
-      </p:pic>
       <p:sp>
         <p:nvSpPr>
           <p:cNvPr id="3" name="Date Placeholder 2">
@@ -31161,7 +31129,7 @@
           <a:p>
             <a:fld id="{27C518E8-5D7C-4649-8F94-035AF1A8A43A}" type="datetime10">
               <a:rPr lang="en-US" smtClean="0"/>
-              <a:t>09:34</a:t>
+              <a:t>10:53</a:t>
             </a:fld>
             <a:endParaRPr lang="en-US" dirty="0"/>
           </a:p>
@@ -31249,7 +31217,7 @@
           <p:nvPr/>
         </p:nvPicPr>
         <p:blipFill>
-          <a:blip r:embed="rId4"/>
+          <a:blip r:embed="rId3"/>
           <a:stretch>
             <a:fillRect/>
           </a:stretch>
@@ -31258,6 +31226,38 @@
           <a:xfrm>
             <a:off x="3886203" y="2005688"/>
             <a:ext cx="4572000" cy="2498481"/>
+          </a:xfrm>
+          <a:prstGeom prst="rect">
+            <a:avLst/>
+          </a:prstGeom>
+        </p:spPr>
+      </p:pic>
+      <p:pic>
+        <p:nvPicPr>
+          <p:cNvPr id="14" name="Content Placeholder 13">
+            <a:extLst>
+              <a:ext uri="{FF2B5EF4-FFF2-40B4-BE49-F238E27FC236}">
+                <a16:creationId xmlns:a16="http://schemas.microsoft.com/office/drawing/2014/main" id="{031B12BC-039A-4251-9C5C-206DCE53A1CB}"/>
+              </a:ext>
+            </a:extLst>
+          </p:cNvPr>
+          <p:cNvPicPr>
+            <a:picLocks noGrp="1" noChangeAspect="1"/>
+          </p:cNvPicPr>
+          <p:nvPr>
+            <p:ph sz="half" idx="2"/>
+          </p:nvPr>
+        </p:nvPicPr>
+        <p:blipFill>
+          <a:blip r:embed="rId4"/>
+          <a:stretch>
+            <a:fillRect/>
+          </a:stretch>
+        </p:blipFill>
+        <p:spPr>
+          <a:xfrm>
+            <a:off x="5094720" y="2872454"/>
+            <a:ext cx="4572000" cy="2398163"/>
           </a:xfrm>
           <a:prstGeom prst="rect">
             <a:avLst/>
@@ -31966,7 +31966,7 @@
           <a:p>
             <a:fld id="{2D04F858-08DB-41EB-9CB2-80C61205FD3A}" type="datetime10">
               <a:rPr lang="en-US" smtClean="0"/>
-              <a:t>09:34</a:t>
+              <a:t>10:53</a:t>
             </a:fld>
             <a:endParaRPr lang="en-US" dirty="0"/>
           </a:p>
@@ -32192,7 +32192,7 @@
           <a:p>
             <a:fld id="{C32998D7-A083-4C17-8C9E-5AC0F052D3D3}" type="datetime10">
               <a:rPr lang="en-US" smtClean="0"/>
-              <a:t>09:34</a:t>
+              <a:t>10:53</a:t>
             </a:fld>
             <a:endParaRPr lang="en-US" dirty="0"/>
           </a:p>
@@ -32758,7 +32758,7 @@
           <a:p>
             <a:fld id="{2D3FF09A-127F-4FD5-8FA5-C123F8ADED70}" type="datetime10">
               <a:rPr lang="en-US" smtClean="0"/>
-              <a:t>09:34</a:t>
+              <a:t>10:53</a:t>
             </a:fld>
             <a:endParaRPr lang="en-US" dirty="0"/>
           </a:p>
@@ -33337,7 +33337,7 @@
           <a:p>
             <a:fld id="{E08F3261-7EBF-4415-8D0F-39655E069F57}" type="datetime10">
               <a:rPr lang="en-US" smtClean="0"/>
-              <a:t>09:34</a:t>
+              <a:t>10:53</a:t>
             </a:fld>
             <a:endParaRPr lang="en-US" dirty="0"/>
           </a:p>
@@ -33858,7 +33858,7 @@
           <a:p>
             <a:fld id="{0068AEF5-D806-4F2C-92A9-131F28F21E51}" type="datetime10">
               <a:rPr lang="en-US" smtClean="0"/>
-              <a:t>09:34</a:t>
+              <a:t>10:53</a:t>
             </a:fld>
             <a:endParaRPr lang="en-US" dirty="0"/>
           </a:p>
@@ -34062,7 +34062,7 @@
           <a:p>
             <a:fld id="{4CC79397-8384-4B70-A2CC-236265DB3AC3}" type="datetime10">
               <a:rPr lang="en-US" smtClean="0"/>
-              <a:t>09:34</a:t>
+              <a:t>10:53</a:t>
             </a:fld>
             <a:endParaRPr lang="en-US" dirty="0"/>
           </a:p>
@@ -34267,7 +34267,7 @@
           <a:p>
             <a:fld id="{444BF256-95AE-4058-96A4-331F56A7760F}" type="datetime10">
               <a:rPr lang="en-US" smtClean="0"/>
-              <a:t>09:34</a:t>
+              <a:t>10:53</a:t>
             </a:fld>
             <a:endParaRPr lang="en-US" dirty="0"/>
           </a:p>
@@ -34502,7 +34502,7 @@
           <a:p>
             <a:fld id="{F1A953E1-E8DB-4871-8C2A-CC64B4F888AE}" type="datetime10">
               <a:rPr lang="en-US" smtClean="0"/>
-              <a:t>09:34</a:t>
+              <a:t>10:53</a:t>
             </a:fld>
             <a:endParaRPr lang="en-US" dirty="0"/>
           </a:p>
@@ -34969,7 +34969,7 @@
           <a:p>
             <a:fld id="{D3153E94-B33B-472F-BBAF-E6998C12CD5A}" type="datetime10">
               <a:rPr lang="en-US" smtClean="0"/>
-              <a:t>09:34</a:t>
+              <a:t>10:53</a:t>
             </a:fld>
             <a:endParaRPr lang="en-US" dirty="0"/>
           </a:p>
@@ -35192,7 +35192,7 @@
           <a:p>
             <a:fld id="{BB81D05C-A40F-4F3D-A914-59C63139A889}" type="datetime10">
               <a:rPr lang="en-US" smtClean="0"/>
-              <a:t>09:34</a:t>
+              <a:t>10:53</a:t>
             </a:fld>
             <a:endParaRPr lang="en-US" dirty="0"/>
           </a:p>
@@ -35318,7 +35318,7 @@
           <a:p>
             <a:fld id="{042BA5FA-A214-4040-91F3-F1B8E1371194}" type="datetime10">
               <a:rPr lang="en-US" smtClean="0"/>
-              <a:t>09:34</a:t>
+              <a:t>10:53</a:t>
             </a:fld>
             <a:endParaRPr lang="en-US" dirty="0"/>
           </a:p>
@@ -35602,7 +35602,7 @@
           <a:p>
             <a:fld id="{D11EB4E2-1534-4121-BF94-CDB4399CC55B}" type="datetime10">
               <a:rPr lang="en-US" smtClean="0"/>
-              <a:t>09:34</a:t>
+              <a:t>10:53</a:t>
             </a:fld>
             <a:endParaRPr lang="en-US" dirty="0"/>
           </a:p>
@@ -35957,7 +35957,7 @@
           <a:p>
             <a:fld id="{612721A5-9267-4A84-AAA4-EAA27041C262}" type="datetime10">
               <a:rPr lang="en-US" smtClean="0"/>
-              <a:t>09:34</a:t>
+              <a:t>10:53</a:t>
             </a:fld>
             <a:endParaRPr lang="en-US" dirty="0"/>
           </a:p>
@@ -36188,7 +36188,7 @@
           <a:p>
             <a:fld id="{5A2FE4E9-A15C-4261-BF8A-34510BD77563}" type="datetime10">
               <a:rPr lang="en-US" smtClean="0"/>
-              <a:t>09:34</a:t>
+              <a:t>10:53</a:t>
             </a:fld>
             <a:endParaRPr lang="en-US" dirty="0"/>
           </a:p>
@@ -36387,7 +36387,7 @@
           <a:p>
             <a:fld id="{63C43826-EE56-4C56-B98A-7331455E3953}" type="datetime10">
               <a:rPr lang="en-US" smtClean="0"/>
-              <a:t>09:34</a:t>
+              <a:t>10:53</a:t>
             </a:fld>
             <a:endParaRPr lang="en-US" dirty="0"/>
           </a:p>
@@ -36579,7 +36579,7 @@
           <a:p>
             <a:fld id="{6A32B98B-FE4C-48F6-9175-557412F78480}" type="datetime10">
               <a:rPr lang="en-US" smtClean="0"/>
-              <a:t>09:34</a:t>
+              <a:t>10:53</a:t>
             </a:fld>
             <a:endParaRPr lang="en-US" dirty="0"/>
           </a:p>
@@ -36774,7 +36774,7 @@
           <a:p>
             <a:fld id="{438D2649-C8DC-4274-905C-196DEEDF4D2C}" type="datetime10">
               <a:rPr lang="en-US" smtClean="0"/>
-              <a:t>09:34</a:t>
+              <a:t>10:53</a:t>
             </a:fld>
             <a:endParaRPr lang="en-US" dirty="0"/>
           </a:p>
@@ -37021,7 +37021,7 @@
           <a:p>
             <a:fld id="{72BF0319-8DBE-4F80-B1CD-A5FF08358001}" type="datetime10">
               <a:rPr lang="en-US" smtClean="0"/>
-              <a:t>09:34</a:t>
+              <a:t>10:53</a:t>
             </a:fld>
             <a:endParaRPr lang="en-US" dirty="0"/>
           </a:p>
@@ -37584,7 +37584,7 @@
           <a:p>
             <a:fld id="{F606B2EF-FB75-43D0-A7F0-C4D134A71367}" type="datetime10">
               <a:rPr lang="en-US" smtClean="0"/>
-              <a:t>09:34</a:t>
+              <a:t>10:53</a:t>
             </a:fld>
             <a:endParaRPr lang="en-US" dirty="0"/>
           </a:p>
@@ -37873,7 +37873,7 @@
           <a:p>
             <a:fld id="{B881A352-0651-49A1-8942-D1B1F0BAF868}" type="datetime10">
               <a:rPr lang="en-US" smtClean="0"/>
-              <a:t>09:34</a:t>
+              <a:t>10:53</a:t>
             </a:fld>
             <a:endParaRPr lang="en-US" dirty="0"/>
           </a:p>
@@ -38275,7 +38275,7 @@
           <a:p>
             <a:fld id="{612721A5-9267-4A84-AAA4-EAA27041C262}" type="datetime10">
               <a:rPr lang="en-US" smtClean="0"/>
-              <a:t>09:34</a:t>
+              <a:t>10:53</a:t>
             </a:fld>
             <a:endParaRPr lang="en-US" dirty="0"/>
           </a:p>
@@ -38575,7 +38575,7 @@
           <a:p>
             <a:fld id="{71E791FD-A5F8-4BF7-9BFB-5C9E46B6136E}" type="datetime10">
               <a:rPr lang="en-US" smtClean="0"/>
-              <a:t>09:34</a:t>
+              <a:t>10:53</a:t>
             </a:fld>
             <a:endParaRPr lang="en-US" dirty="0"/>
           </a:p>
@@ -39123,7 +39123,7 @@
           <a:p>
             <a:fld id="{FD347043-9C12-42D7-92CE-B29BD404F5F4}" type="datetime10">
               <a:rPr lang="en-US" smtClean="0"/>
-              <a:t>09:34</a:t>
+              <a:t>10:53</a:t>
             </a:fld>
             <a:endParaRPr lang="en-US" dirty="0"/>
           </a:p>
@@ -39351,7 +39351,7 @@
           <a:p>
             <a:fld id="{F638F944-6B27-4644-A0F2-ECBC3726F752}" type="datetime10">
               <a:rPr lang="en-US" smtClean="0"/>
-              <a:t>09:34</a:t>
+              <a:t>10:53</a:t>
             </a:fld>
             <a:endParaRPr lang="en-US" dirty="0"/>
           </a:p>
@@ -39594,7 +39594,7 @@
           <a:p>
             <a:fld id="{B9FDC29A-2C1E-48CD-BE6F-CD11CC5138B7}" type="datetime10">
               <a:rPr lang="en-US" smtClean="0"/>
-              <a:t>09:34</a:t>
+              <a:t>10:53</a:t>
             </a:fld>
             <a:endParaRPr lang="en-US" dirty="0"/>
           </a:p>
@@ -39971,7 +39971,7 @@
           <a:p>
             <a:fld id="{4C145DFF-3EF7-4F1C-A3F6-F089D2324AC3}" type="datetime10">
               <a:rPr lang="en-US" smtClean="0"/>
-              <a:t>09:34</a:t>
+              <a:t>10:53</a:t>
             </a:fld>
             <a:endParaRPr lang="en-US" dirty="0"/>
           </a:p>
@@ -40126,7 +40126,7 @@
           <a:p>
             <a:fld id="{8D7B2386-6345-44B8-9FC7-CB369D17F86A}" type="datetime10">
               <a:rPr lang="en-US" smtClean="0"/>
-              <a:t>09:34</a:t>
+              <a:t>10:53</a:t>
             </a:fld>
             <a:endParaRPr lang="en-US" dirty="0"/>
           </a:p>
@@ -40413,7 +40413,7 @@
           <a:p>
             <a:fld id="{ECAC1157-DA25-4A00-806E-1BAAAF745875}" type="datetime10">
               <a:rPr lang="en-US" smtClean="0"/>
-              <a:t>09:34</a:t>
+              <a:t>10:53</a:t>
             </a:fld>
             <a:endParaRPr lang="en-US" dirty="0"/>
           </a:p>

</xml_diff>